<commit_message>
version améliorée le 08/03/2019
</commit_message>
<xml_diff>
--- a/Support/Figures.pptx
+++ b/Support/Figures.pptx
@@ -13,6 +13,7 @@
     <p:sldId id="259" r:id="rId7"/>
     <p:sldId id="262" r:id="rId8"/>
     <p:sldId id="263" r:id="rId9"/>
+    <p:sldId id="264" r:id="rId10"/>
   </p:sldIdLst>
   <p:sldSz cx="12192000" cy="6858000"/>
   <p:notesSz cx="6858000" cy="9144000"/>
@@ -250,7 +251,7 @@
           <a:p>
             <a:fld id="{66CF1B35-9962-4754-9069-4529B19CDBAF}" type="datetimeFigureOut">
               <a:rPr lang="fr-FR" smtClean="0"/>
-              <a:t>07/03/2019</a:t>
+              <a:t>08/03/2019</a:t>
             </a:fld>
             <a:endParaRPr lang="fr-FR"/>
           </a:p>
@@ -420,7 +421,7 @@
           <a:p>
             <a:fld id="{66CF1B35-9962-4754-9069-4529B19CDBAF}" type="datetimeFigureOut">
               <a:rPr lang="fr-FR" smtClean="0"/>
-              <a:t>07/03/2019</a:t>
+              <a:t>08/03/2019</a:t>
             </a:fld>
             <a:endParaRPr lang="fr-FR"/>
           </a:p>
@@ -600,7 +601,7 @@
           <a:p>
             <a:fld id="{66CF1B35-9962-4754-9069-4529B19CDBAF}" type="datetimeFigureOut">
               <a:rPr lang="fr-FR" smtClean="0"/>
-              <a:t>07/03/2019</a:t>
+              <a:t>08/03/2019</a:t>
             </a:fld>
             <a:endParaRPr lang="fr-FR"/>
           </a:p>
@@ -770,7 +771,7 @@
           <a:p>
             <a:fld id="{66CF1B35-9962-4754-9069-4529B19CDBAF}" type="datetimeFigureOut">
               <a:rPr lang="fr-FR" smtClean="0"/>
-              <a:t>07/03/2019</a:t>
+              <a:t>08/03/2019</a:t>
             </a:fld>
             <a:endParaRPr lang="fr-FR"/>
           </a:p>
@@ -1016,7 +1017,7 @@
           <a:p>
             <a:fld id="{66CF1B35-9962-4754-9069-4529B19CDBAF}" type="datetimeFigureOut">
               <a:rPr lang="fr-FR" smtClean="0"/>
-              <a:t>07/03/2019</a:t>
+              <a:t>08/03/2019</a:t>
             </a:fld>
             <a:endParaRPr lang="fr-FR"/>
           </a:p>
@@ -1248,7 +1249,7 @@
           <a:p>
             <a:fld id="{66CF1B35-9962-4754-9069-4529B19CDBAF}" type="datetimeFigureOut">
               <a:rPr lang="fr-FR" smtClean="0"/>
-              <a:t>07/03/2019</a:t>
+              <a:t>08/03/2019</a:t>
             </a:fld>
             <a:endParaRPr lang="fr-FR"/>
           </a:p>
@@ -1615,7 +1616,7 @@
           <a:p>
             <a:fld id="{66CF1B35-9962-4754-9069-4529B19CDBAF}" type="datetimeFigureOut">
               <a:rPr lang="fr-FR" smtClean="0"/>
-              <a:t>07/03/2019</a:t>
+              <a:t>08/03/2019</a:t>
             </a:fld>
             <a:endParaRPr lang="fr-FR"/>
           </a:p>
@@ -1733,7 +1734,7 @@
           <a:p>
             <a:fld id="{66CF1B35-9962-4754-9069-4529B19CDBAF}" type="datetimeFigureOut">
               <a:rPr lang="fr-FR" smtClean="0"/>
-              <a:t>07/03/2019</a:t>
+              <a:t>08/03/2019</a:t>
             </a:fld>
             <a:endParaRPr lang="fr-FR"/>
           </a:p>
@@ -1828,7 +1829,7 @@
           <a:p>
             <a:fld id="{66CF1B35-9962-4754-9069-4529B19CDBAF}" type="datetimeFigureOut">
               <a:rPr lang="fr-FR" smtClean="0"/>
-              <a:t>07/03/2019</a:t>
+              <a:t>08/03/2019</a:t>
             </a:fld>
             <a:endParaRPr lang="fr-FR"/>
           </a:p>
@@ -2105,7 +2106,7 @@
           <a:p>
             <a:fld id="{66CF1B35-9962-4754-9069-4529B19CDBAF}" type="datetimeFigureOut">
               <a:rPr lang="fr-FR" smtClean="0"/>
-              <a:t>07/03/2019</a:t>
+              <a:t>08/03/2019</a:t>
             </a:fld>
             <a:endParaRPr lang="fr-FR"/>
           </a:p>
@@ -2358,7 +2359,7 @@
           <a:p>
             <a:fld id="{66CF1B35-9962-4754-9069-4529B19CDBAF}" type="datetimeFigureOut">
               <a:rPr lang="fr-FR" smtClean="0"/>
-              <a:t>07/03/2019</a:t>
+              <a:t>08/03/2019</a:t>
             </a:fld>
             <a:endParaRPr lang="fr-FR"/>
           </a:p>
@@ -2571,7 +2572,7 @@
           <a:p>
             <a:fld id="{66CF1B35-9962-4754-9069-4529B19CDBAF}" type="datetimeFigureOut">
               <a:rPr lang="fr-FR" smtClean="0"/>
-              <a:t>07/03/2019</a:t>
+              <a:t>08/03/2019</a:t>
             </a:fld>
             <a:endParaRPr lang="fr-FR"/>
           </a:p>
@@ -24920,6 +24921,2166 @@
 </p:sld>
 </file>
 
+<file path=ppt/slides/slide9.xml><?xml version="1.0" encoding="utf-8"?>
+<p:sld xmlns:a="http://schemas.openxmlformats.org/drawingml/2006/main" xmlns:r="http://schemas.openxmlformats.org/officeDocument/2006/relationships" xmlns:p="http://schemas.openxmlformats.org/presentationml/2006/main">
+  <p:cSld>
+    <p:spTree>
+      <p:nvGrpSpPr>
+        <p:cNvPr id="1" name=""/>
+        <p:cNvGrpSpPr/>
+        <p:nvPr/>
+      </p:nvGrpSpPr>
+      <p:grpSpPr>
+        <a:xfrm>
+          <a:off x="0" y="0"/>
+          <a:ext cx="0" cy="0"/>
+          <a:chOff x="0" y="0"/>
+          <a:chExt cx="0" cy="0"/>
+        </a:xfrm>
+      </p:grpSpPr>
+      <p:grpSp>
+        <p:nvGrpSpPr>
+          <p:cNvPr id="23" name="Groupe 22"/>
+          <p:cNvGrpSpPr/>
+          <p:nvPr/>
+        </p:nvGrpSpPr>
+        <p:grpSpPr>
+          <a:xfrm>
+            <a:off x="1733418" y="5008003"/>
+            <a:ext cx="798461" cy="1429491"/>
+            <a:chOff x="1049422" y="2910837"/>
+            <a:chExt cx="798461" cy="1429491"/>
+          </a:xfrm>
+        </p:grpSpPr>
+        <p:cxnSp>
+          <p:nvCxnSpPr>
+            <p:cNvPr id="30" name="Connecteur droit avec flèche 29"/>
+            <p:cNvCxnSpPr/>
+            <p:nvPr/>
+          </p:nvCxnSpPr>
+          <p:spPr>
+            <a:xfrm>
+              <a:off x="1066579" y="3525170"/>
+              <a:ext cx="624466" cy="0"/>
+            </a:xfrm>
+            <a:prstGeom prst="straightConnector1">
+              <a:avLst/>
+            </a:prstGeom>
+            <a:ln w="19050">
+              <a:solidFill>
+                <a:srgbClr val="767171"/>
+              </a:solidFill>
+              <a:prstDash val="solid"/>
+              <a:tailEnd type="triangle"/>
+            </a:ln>
+          </p:spPr>
+          <p:style>
+            <a:lnRef idx="1">
+              <a:schemeClr val="accent1"/>
+            </a:lnRef>
+            <a:fillRef idx="0">
+              <a:schemeClr val="accent1"/>
+            </a:fillRef>
+            <a:effectRef idx="0">
+              <a:schemeClr val="accent1"/>
+            </a:effectRef>
+            <a:fontRef idx="minor">
+              <a:schemeClr val="tx1"/>
+            </a:fontRef>
+          </p:style>
+        </p:cxnSp>
+        <p:cxnSp>
+          <p:nvCxnSpPr>
+            <p:cNvPr id="31" name="Connecteur droit avec flèche 30"/>
+            <p:cNvCxnSpPr/>
+            <p:nvPr/>
+          </p:nvCxnSpPr>
+          <p:spPr>
+            <a:xfrm>
+              <a:off x="1066580" y="3525170"/>
+              <a:ext cx="0" cy="677833"/>
+            </a:xfrm>
+            <a:prstGeom prst="straightConnector1">
+              <a:avLst/>
+            </a:prstGeom>
+            <a:ln w="19050">
+              <a:solidFill>
+                <a:srgbClr val="767171"/>
+              </a:solidFill>
+              <a:prstDash val="solid"/>
+              <a:tailEnd type="triangle"/>
+            </a:ln>
+          </p:spPr>
+          <p:style>
+            <a:lnRef idx="1">
+              <a:schemeClr val="accent1"/>
+            </a:lnRef>
+            <a:fillRef idx="0">
+              <a:schemeClr val="accent1"/>
+            </a:fillRef>
+            <a:effectRef idx="0">
+              <a:schemeClr val="accent1"/>
+            </a:effectRef>
+            <a:fontRef idx="minor">
+              <a:schemeClr val="tx1"/>
+            </a:fontRef>
+          </p:style>
+        </p:cxnSp>
+        <mc:AlternateContent xmlns:mc="http://schemas.openxmlformats.org/markup-compatibility/2006">
+          <mc:Choice xmlns:a14="http://schemas.microsoft.com/office/drawing/2010/main" Requires="a14">
+            <p:sp>
+              <p:nvSpPr>
+                <p:cNvPr id="32" name="Zone de texte 153"/>
+                <p:cNvSpPr txBox="1"/>
+                <p:nvPr/>
+              </p:nvSpPr>
+              <p:spPr>
+                <a:xfrm>
+                  <a:off x="1049422" y="4065678"/>
+                  <a:ext cx="301748" cy="274650"/>
+                </a:xfrm>
+                <a:prstGeom prst="rect">
+                  <a:avLst/>
+                </a:prstGeom>
+                <a:noFill/>
+                <a:ln w="6350">
+                  <a:noFill/>
+                  <a:prstDash val="sysDash"/>
+                </a:ln>
+                <a:effectLst/>
+              </p:spPr>
+              <p:style>
+                <a:lnRef idx="0">
+                  <a:schemeClr val="accent1"/>
+                </a:lnRef>
+                <a:fillRef idx="0">
+                  <a:schemeClr val="accent1"/>
+                </a:fillRef>
+                <a:effectRef idx="0">
+                  <a:schemeClr val="accent1"/>
+                </a:effectRef>
+                <a:fontRef idx="minor">
+                  <a:schemeClr val="dk1"/>
+                </a:fontRef>
+              </p:style>
+              <p:txBody>
+                <a:bodyPr rot="0" spcFirstLastPara="0" vert="horz" wrap="square" lIns="91440" tIns="45720" rIns="91440" bIns="45720" numCol="1" spcCol="0" rtlCol="0" fromWordArt="0" anchor="t" anchorCtr="0" forceAA="0" compatLnSpc="1">
+                  <a:prstTxWarp prst="textNoShape">
+                    <a:avLst/>
+                  </a:prstTxWarp>
+                  <a:noAutofit/>
+                </a:bodyPr>
+                <a:lstStyle/>
+                <a:p>
+                  <a:pPr>
+                    <a:lnSpc>
+                      <a:spcPct val="107000"/>
+                    </a:lnSpc>
+                    <a:spcAft>
+                      <a:spcPts val="800"/>
+                    </a:spcAft>
+                  </a:pPr>
+                  <a14:m>
+                    <m:oMath xmlns:m="http://schemas.openxmlformats.org/officeDocument/2006/math">
+                      <m:r>
+                        <a:rPr lang="fr-FR" sz="1400" b="1" i="1" smtClean="0">
+                          <a:solidFill>
+                            <a:srgbClr val="767171"/>
+                          </a:solidFill>
+                          <a:effectLst/>
+                          <a:latin typeface="Cambria Math" panose="02040503050406030204" pitchFamily="18" charset="0"/>
+                          <a:ea typeface="Calibri" panose="020F0502020204030204" pitchFamily="34" charset="0"/>
+                          <a:cs typeface="Times New Roman" panose="02020603050405020304" pitchFamily="18" charset="0"/>
+                        </a:rPr>
+                        <m:t>𝒓</m:t>
+                      </m:r>
+                    </m:oMath>
+                  </a14:m>
+                  <a:r>
+                    <a:rPr lang="fr-FR" sz="1400" dirty="0">
+                      <a:effectLst/>
+                      <a:ea typeface="Calibri" panose="020F0502020204030204" pitchFamily="34" charset="0"/>
+                      <a:cs typeface="Times New Roman" panose="02020603050405020304" pitchFamily="18" charset="0"/>
+                    </a:rPr>
+                    <a:t> </a:t>
+                  </a:r>
+                </a:p>
+              </p:txBody>
+            </p:sp>
+          </mc:Choice>
+          <mc:Fallback>
+            <p:sp>
+              <p:nvSpPr>
+                <p:cNvPr id="32" name="Zone de texte 153"/>
+                <p:cNvSpPr txBox="1">
+                  <a:spLocks noRot="1" noChangeAspect="1" noMove="1" noResize="1" noEditPoints="1" noAdjustHandles="1" noChangeArrowheads="1" noChangeShapeType="1" noTextEdit="1"/>
+                </p:cNvSpPr>
+                <p:nvPr/>
+              </p:nvSpPr>
+              <p:spPr>
+                <a:xfrm>
+                  <a:off x="1049422" y="4065678"/>
+                  <a:ext cx="301748" cy="274650"/>
+                </a:xfrm>
+                <a:prstGeom prst="rect">
+                  <a:avLst/>
+                </a:prstGeom>
+                <a:blipFill rotWithShape="0">
+                  <a:blip r:embed="rId2"/>
+                  <a:stretch>
+                    <a:fillRect/>
+                  </a:stretch>
+                </a:blipFill>
+                <a:ln w="6350">
+                  <a:noFill/>
+                  <a:prstDash val="sysDash"/>
+                </a:ln>
+                <a:effectLst/>
+              </p:spPr>
+              <p:txBody>
+                <a:bodyPr/>
+                <a:lstStyle/>
+                <a:p>
+                  <a:r>
+                    <a:rPr lang="fr-FR">
+                      <a:noFill/>
+                    </a:rPr>
+                    <a:t> </a:t>
+                  </a:r>
+                </a:p>
+              </p:txBody>
+            </p:sp>
+          </mc:Fallback>
+        </mc:AlternateContent>
+        <mc:AlternateContent xmlns:mc="http://schemas.openxmlformats.org/markup-compatibility/2006" xmlns:a14="http://schemas.microsoft.com/office/drawing/2010/main">
+          <mc:Choice Requires="a14">
+            <p:sp>
+              <p:nvSpPr>
+                <p:cNvPr id="33" name="Zone de texte 154"/>
+                <p:cNvSpPr txBox="1"/>
+                <p:nvPr/>
+              </p:nvSpPr>
+              <p:spPr>
+                <a:xfrm>
+                  <a:off x="1546135" y="3480903"/>
+                  <a:ext cx="301748" cy="274650"/>
+                </a:xfrm>
+                <a:prstGeom prst="rect">
+                  <a:avLst/>
+                </a:prstGeom>
+                <a:noFill/>
+                <a:ln w="6350">
+                  <a:noFill/>
+                  <a:prstDash val="sysDash"/>
+                </a:ln>
+                <a:effectLst/>
+              </p:spPr>
+              <p:style>
+                <a:lnRef idx="0">
+                  <a:schemeClr val="accent1"/>
+                </a:lnRef>
+                <a:fillRef idx="0">
+                  <a:schemeClr val="accent1"/>
+                </a:fillRef>
+                <a:effectRef idx="0">
+                  <a:schemeClr val="accent1"/>
+                </a:effectRef>
+                <a:fontRef idx="minor">
+                  <a:schemeClr val="dk1"/>
+                </a:fontRef>
+              </p:style>
+              <p:txBody>
+                <a:bodyPr rot="0" spcFirstLastPara="0" vert="horz" wrap="square" lIns="91440" tIns="45720" rIns="91440" bIns="45720" numCol="1" spcCol="0" rtlCol="0" fromWordArt="0" anchor="t" anchorCtr="0" forceAA="0" compatLnSpc="1">
+                  <a:prstTxWarp prst="textNoShape">
+                    <a:avLst/>
+                  </a:prstTxWarp>
+                  <a:noAutofit/>
+                </a:bodyPr>
+                <a:lstStyle/>
+                <a:p>
+                  <a:pPr>
+                    <a:lnSpc>
+                      <a:spcPct val="107000"/>
+                    </a:lnSpc>
+                    <a:spcAft>
+                      <a:spcPts val="800"/>
+                    </a:spcAft>
+                  </a:pPr>
+                  <a14:m>
+                    <m:oMath xmlns:m="http://schemas.openxmlformats.org/officeDocument/2006/math">
+                      <m:r>
+                        <a:rPr lang="fr-FR" sz="1400" b="1" i="1" dirty="0" smtClean="0">
+                          <a:solidFill>
+                            <a:srgbClr val="767171"/>
+                          </a:solidFill>
+                          <a:effectLst/>
+                          <a:latin typeface="Cambria Math" panose="02040503050406030204" pitchFamily="18" charset="0"/>
+                          <a:ea typeface="Calibri" panose="020F0502020204030204" pitchFamily="34" charset="0"/>
+                          <a:cs typeface="Times New Roman" panose="02020603050405020304" pitchFamily="18" charset="0"/>
+                        </a:rPr>
+                        <m:t>𝒁</m:t>
+                      </m:r>
+                    </m:oMath>
+                  </a14:m>
+                  <a:r>
+                    <a:rPr lang="fr-FR" sz="1400" dirty="0">
+                      <a:effectLst/>
+                      <a:ea typeface="Calibri" panose="020F0502020204030204" pitchFamily="34" charset="0"/>
+                      <a:cs typeface="Times New Roman" panose="02020603050405020304" pitchFamily="18" charset="0"/>
+                    </a:rPr>
+                    <a:t> </a:t>
+                  </a:r>
+                </a:p>
+              </p:txBody>
+            </p:sp>
+          </mc:Choice>
+          <mc:Fallback xmlns="">
+            <p:sp>
+              <p:nvSpPr>
+                <p:cNvPr id="141" name="Zone de texte 154"/>
+                <p:cNvSpPr txBox="1">
+                  <a:spLocks noRot="1" noChangeAspect="1" noMove="1" noResize="1" noEditPoints="1" noAdjustHandles="1" noChangeArrowheads="1" noChangeShapeType="1" noTextEdit="1"/>
+                </p:cNvSpPr>
+                <p:nvPr/>
+              </p:nvSpPr>
+              <p:spPr>
+                <a:xfrm>
+                  <a:off x="1546135" y="3480903"/>
+                  <a:ext cx="301748" cy="274650"/>
+                </a:xfrm>
+                <a:prstGeom prst="rect">
+                  <a:avLst/>
+                </a:prstGeom>
+                <a:blipFill rotWithShape="0">
+                  <a:blip r:embed="rId14"/>
+                  <a:stretch>
+                    <a:fillRect/>
+                  </a:stretch>
+                </a:blipFill>
+                <a:ln w="6350">
+                  <a:noFill/>
+                  <a:prstDash val="sysDash"/>
+                </a:ln>
+                <a:effectLst/>
+              </p:spPr>
+              <p:txBody>
+                <a:bodyPr/>
+                <a:lstStyle/>
+                <a:p>
+                  <a:r>
+                    <a:rPr lang="fr-FR">
+                      <a:noFill/>
+                    </a:rPr>
+                    <a:t> </a:t>
+                  </a:r>
+                </a:p>
+              </p:txBody>
+            </p:sp>
+          </mc:Fallback>
+        </mc:AlternateContent>
+        <mc:AlternateContent xmlns:mc="http://schemas.openxmlformats.org/markup-compatibility/2006">
+          <mc:Choice xmlns:a14="http://schemas.microsoft.com/office/drawing/2010/main" Requires="a14">
+            <p:sp>
+              <p:nvSpPr>
+                <p:cNvPr id="34" name="Zone de texte 154"/>
+                <p:cNvSpPr txBox="1"/>
+                <p:nvPr/>
+              </p:nvSpPr>
+              <p:spPr>
+                <a:xfrm>
+                  <a:off x="1415686" y="2910837"/>
+                  <a:ext cx="183498" cy="274250"/>
+                </a:xfrm>
+                <a:prstGeom prst="rect">
+                  <a:avLst/>
+                </a:prstGeom>
+                <a:noFill/>
+                <a:ln w="6350">
+                  <a:noFill/>
+                  <a:prstDash val="sysDash"/>
+                </a:ln>
+                <a:effectLst/>
+              </p:spPr>
+              <p:style>
+                <a:lnRef idx="0">
+                  <a:schemeClr val="accent1"/>
+                </a:lnRef>
+                <a:fillRef idx="0">
+                  <a:schemeClr val="accent1"/>
+                </a:fillRef>
+                <a:effectRef idx="0">
+                  <a:schemeClr val="accent1"/>
+                </a:effectRef>
+                <a:fontRef idx="minor">
+                  <a:schemeClr val="dk1"/>
+                </a:fontRef>
+              </p:style>
+              <p:txBody>
+                <a:bodyPr rot="0" spcFirstLastPara="0" vert="horz" wrap="square" lIns="91440" tIns="45720" rIns="91440" bIns="45720" numCol="1" spcCol="0" rtlCol="0" fromWordArt="0" anchor="t" anchorCtr="0" forceAA="0" compatLnSpc="1">
+                  <a:prstTxWarp prst="textNoShape">
+                    <a:avLst/>
+                  </a:prstTxWarp>
+                  <a:noAutofit/>
+                </a:bodyPr>
+                <a:lstStyle/>
+                <a:p>
+                  <a:pPr>
+                    <a:lnSpc>
+                      <a:spcPct val="107000"/>
+                    </a:lnSpc>
+                    <a:spcAft>
+                      <a:spcPts val="800"/>
+                    </a:spcAft>
+                  </a:pPr>
+                  <a14:m>
+                    <m:oMath xmlns:m="http://schemas.openxmlformats.org/officeDocument/2006/math">
+                      <m:r>
+                        <a:rPr lang="fr-FR" sz="1400" b="1" i="1" dirty="0" smtClean="0">
+                          <a:solidFill>
+                            <a:srgbClr val="767171"/>
+                          </a:solidFill>
+                          <a:effectLst/>
+                          <a:latin typeface="Cambria Math" panose="02040503050406030204" pitchFamily="18" charset="0"/>
+                          <a:ea typeface="Calibri" panose="020F0502020204030204" pitchFamily="34" charset="0"/>
+                          <a:cs typeface="Times New Roman" panose="02020603050405020304" pitchFamily="18" charset="0"/>
+                        </a:rPr>
+                        <m:t>𝒕</m:t>
+                      </m:r>
+                    </m:oMath>
+                  </a14:m>
+                  <a:r>
+                    <a:rPr lang="fr-FR" sz="1400" dirty="0">
+                      <a:effectLst/>
+                      <a:ea typeface="Calibri" panose="020F0502020204030204" pitchFamily="34" charset="0"/>
+                      <a:cs typeface="Times New Roman" panose="02020603050405020304" pitchFamily="18" charset="0"/>
+                    </a:rPr>
+                    <a:t> </a:t>
+                  </a:r>
+                </a:p>
+              </p:txBody>
+            </p:sp>
+          </mc:Choice>
+          <mc:Fallback>
+            <p:sp>
+              <p:nvSpPr>
+                <p:cNvPr id="34" name="Zone de texte 154"/>
+                <p:cNvSpPr txBox="1">
+                  <a:spLocks noRot="1" noChangeAspect="1" noMove="1" noResize="1" noEditPoints="1" noAdjustHandles="1" noChangeArrowheads="1" noChangeShapeType="1" noTextEdit="1"/>
+                </p:cNvSpPr>
+                <p:nvPr/>
+              </p:nvSpPr>
+              <p:spPr>
+                <a:xfrm>
+                  <a:off x="1415686" y="2910837"/>
+                  <a:ext cx="183498" cy="274250"/>
+                </a:xfrm>
+                <a:prstGeom prst="rect">
+                  <a:avLst/>
+                </a:prstGeom>
+                <a:blipFill rotWithShape="0">
+                  <a:blip r:embed="rId15"/>
+                  <a:stretch>
+                    <a:fillRect r="-19355"/>
+                  </a:stretch>
+                </a:blipFill>
+                <a:ln w="6350">
+                  <a:noFill/>
+                  <a:prstDash val="sysDash"/>
+                </a:ln>
+                <a:effectLst/>
+              </p:spPr>
+              <p:txBody>
+                <a:bodyPr/>
+                <a:lstStyle/>
+                <a:p>
+                  <a:r>
+                    <a:rPr lang="fr-FR">
+                      <a:noFill/>
+                    </a:rPr>
+                    <a:t> </a:t>
+                  </a:r>
+                </a:p>
+              </p:txBody>
+            </p:sp>
+          </mc:Fallback>
+        </mc:AlternateContent>
+        <p:cxnSp>
+          <p:nvCxnSpPr>
+            <p:cNvPr id="35" name="Connecteur droit avec flèche 34"/>
+            <p:cNvCxnSpPr/>
+            <p:nvPr/>
+          </p:nvCxnSpPr>
+          <p:spPr>
+            <a:xfrm flipV="1">
+              <a:off x="1066579" y="3125988"/>
+              <a:ext cx="599334" cy="401932"/>
+            </a:xfrm>
+            <a:prstGeom prst="straightConnector1">
+              <a:avLst/>
+            </a:prstGeom>
+            <a:ln w="19050">
+              <a:solidFill>
+                <a:srgbClr val="767171"/>
+              </a:solidFill>
+              <a:prstDash val="solid"/>
+              <a:tailEnd type="triangle"/>
+            </a:ln>
+          </p:spPr>
+          <p:style>
+            <a:lnRef idx="1">
+              <a:schemeClr val="accent1"/>
+            </a:lnRef>
+            <a:fillRef idx="0">
+              <a:schemeClr val="accent1"/>
+            </a:fillRef>
+            <a:effectRef idx="0">
+              <a:schemeClr val="accent1"/>
+            </a:effectRef>
+            <a:fontRef idx="minor">
+              <a:schemeClr val="tx1"/>
+            </a:fontRef>
+          </p:style>
+        </p:cxnSp>
+      </p:grpSp>
+      <p:grpSp>
+        <p:nvGrpSpPr>
+          <p:cNvPr id="65" name="Groupe 64"/>
+          <p:cNvGrpSpPr/>
+          <p:nvPr/>
+        </p:nvGrpSpPr>
+        <p:grpSpPr>
+          <a:xfrm>
+            <a:off x="3189101" y="1336302"/>
+            <a:ext cx="4774789" cy="3416650"/>
+            <a:chOff x="3189101" y="1336302"/>
+            <a:chExt cx="4774789" cy="3416650"/>
+          </a:xfrm>
+        </p:grpSpPr>
+        <p:grpSp>
+          <p:nvGrpSpPr>
+            <p:cNvPr id="62" name="Groupe 61"/>
+            <p:cNvGrpSpPr/>
+            <p:nvPr/>
+          </p:nvGrpSpPr>
+          <p:grpSpPr>
+            <a:xfrm>
+              <a:off x="3189101" y="1336302"/>
+              <a:ext cx="4774789" cy="3416650"/>
+              <a:chOff x="3189101" y="1336302"/>
+              <a:chExt cx="4774789" cy="3416650"/>
+            </a:xfrm>
+          </p:grpSpPr>
+          <p:grpSp>
+            <p:nvGrpSpPr>
+              <p:cNvPr id="43" name="Groupe 42"/>
+              <p:cNvGrpSpPr/>
+              <p:nvPr/>
+            </p:nvGrpSpPr>
+            <p:grpSpPr>
+              <a:xfrm>
+                <a:off x="3189101" y="1336302"/>
+                <a:ext cx="4774789" cy="3416650"/>
+                <a:chOff x="3192772" y="1336302"/>
+                <a:chExt cx="4774789" cy="3416650"/>
+              </a:xfrm>
+            </p:grpSpPr>
+            <p:pic>
+              <p:nvPicPr>
+                <p:cNvPr id="36" name="Image 35"/>
+                <p:cNvPicPr/>
+                <p:nvPr/>
+              </p:nvPicPr>
+              <p:blipFill>
+                <a:blip r:embed="rId16"/>
+                <a:stretch>
+                  <a:fillRect/>
+                </a:stretch>
+              </p:blipFill>
+              <p:spPr>
+                <a:xfrm>
+                  <a:off x="3192772" y="1336302"/>
+                  <a:ext cx="4774789" cy="3416650"/>
+                </a:xfrm>
+                <a:prstGeom prst="rect">
+                  <a:avLst/>
+                </a:prstGeom>
+              </p:spPr>
+            </p:pic>
+            <p:grpSp>
+              <p:nvGrpSpPr>
+                <p:cNvPr id="37" name="Groupe 36"/>
+                <p:cNvGrpSpPr/>
+                <p:nvPr/>
+              </p:nvGrpSpPr>
+              <p:grpSpPr>
+                <a:xfrm>
+                  <a:off x="5805821" y="3369369"/>
+                  <a:ext cx="514243" cy="359565"/>
+                  <a:chOff x="5805821" y="3369369"/>
+                  <a:chExt cx="514243" cy="359565"/>
+                </a:xfrm>
+              </p:grpSpPr>
+              <p:sp>
+                <p:nvSpPr>
+                  <p:cNvPr id="28" name="Arc 27"/>
+                  <p:cNvSpPr/>
+                  <p:nvPr/>
+                </p:nvSpPr>
+                <p:spPr>
+                  <a:xfrm rot="4876348">
+                    <a:off x="5784102" y="3391088"/>
+                    <a:ext cx="290512" cy="247074"/>
+                  </a:xfrm>
+                  <a:prstGeom prst="arc">
+                    <a:avLst>
+                      <a:gd name="adj1" fmla="val 16200000"/>
+                      <a:gd name="adj2" fmla="val 2933405"/>
+                    </a:avLst>
+                  </a:prstGeom>
+                  <a:ln w="12700">
+                    <a:solidFill>
+                      <a:srgbClr val="036DBF"/>
+                    </a:solidFill>
+                    <a:tailEnd type="triangle"/>
+                  </a:ln>
+                </p:spPr>
+                <p:style>
+                  <a:lnRef idx="1">
+                    <a:schemeClr val="accent1"/>
+                  </a:lnRef>
+                  <a:fillRef idx="0">
+                    <a:schemeClr val="accent1"/>
+                  </a:fillRef>
+                  <a:effectRef idx="0">
+                    <a:schemeClr val="accent1"/>
+                  </a:effectRef>
+                  <a:fontRef idx="minor">
+                    <a:schemeClr val="tx1"/>
+                  </a:fontRef>
+                </p:style>
+                <p:txBody>
+                  <a:bodyPr rtlCol="0" anchor="ctr"/>
+                  <a:lstStyle/>
+                  <a:p>
+                    <a:pPr algn="ctr"/>
+                    <a:endParaRPr lang="fr-FR"/>
+                  </a:p>
+                </p:txBody>
+              </p:sp>
+              <mc:AlternateContent xmlns:mc="http://schemas.openxmlformats.org/markup-compatibility/2006">
+                <mc:Choice xmlns:a14="http://schemas.microsoft.com/office/drawing/2010/main" Requires="a14">
+                  <p:sp>
+                    <p:nvSpPr>
+                      <p:cNvPr id="29" name="Zone de texte 153"/>
+                      <p:cNvSpPr txBox="1"/>
+                      <p:nvPr/>
+                    </p:nvSpPr>
+                    <p:spPr>
+                      <a:xfrm>
+                        <a:off x="6018316" y="3454284"/>
+                        <a:ext cx="301748" cy="274650"/>
+                      </a:xfrm>
+                      <a:prstGeom prst="rect">
+                        <a:avLst/>
+                      </a:prstGeom>
+                      <a:noFill/>
+                      <a:ln w="6350">
+                        <a:noFill/>
+                        <a:prstDash val="sysDash"/>
+                      </a:ln>
+                      <a:effectLst/>
+                    </p:spPr>
+                    <p:style>
+                      <a:lnRef idx="0">
+                        <a:schemeClr val="accent1"/>
+                      </a:lnRef>
+                      <a:fillRef idx="0">
+                        <a:schemeClr val="accent1"/>
+                      </a:fillRef>
+                      <a:effectRef idx="0">
+                        <a:schemeClr val="accent1"/>
+                      </a:effectRef>
+                      <a:fontRef idx="minor">
+                        <a:schemeClr val="dk1"/>
+                      </a:fontRef>
+                    </p:style>
+                    <p:txBody>
+                      <a:bodyPr rot="0" spcFirstLastPara="0" vert="horz" wrap="square" lIns="91440" tIns="45720" rIns="91440" bIns="45720" numCol="1" spcCol="0" rtlCol="0" fromWordArt="0" anchor="t" anchorCtr="0" forceAA="0" compatLnSpc="1">
+                        <a:prstTxWarp prst="textNoShape">
+                          <a:avLst/>
+                        </a:prstTxWarp>
+                        <a:noAutofit/>
+                      </a:bodyPr>
+                      <a:lstStyle/>
+                      <a:p>
+                        <a:pPr>
+                          <a:lnSpc>
+                            <a:spcPct val="107000"/>
+                          </a:lnSpc>
+                          <a:spcAft>
+                            <a:spcPts val="800"/>
+                          </a:spcAft>
+                        </a:pPr>
+                        <a14:m>
+                          <m:oMath xmlns:m="http://schemas.openxmlformats.org/officeDocument/2006/math">
+                            <m:acc>
+                              <m:accPr>
+                                <m:chr m:val="̃"/>
+                                <m:ctrlPr>
+                                  <a:rPr lang="fr-FR" sz="1400" b="0" i="1" smtClean="0">
+                                    <a:solidFill>
+                                      <a:srgbClr val="036DBF"/>
+                                    </a:solidFill>
+                                    <a:effectLst/>
+                                    <a:latin typeface="Cambria Math" panose="02040503050406030204" pitchFamily="18" charset="0"/>
+                                    <a:cs typeface="Times New Roman" panose="02020603050405020304" pitchFamily="18" charset="0"/>
+                                  </a:rPr>
+                                </m:ctrlPr>
+                              </m:accPr>
+                              <m:e>
+                                <m:r>
+                                  <a:rPr lang="fr-FR" sz="1400" i="1">
+                                    <a:solidFill>
+                                      <a:srgbClr val="036DBF"/>
+                                    </a:solidFill>
+                                    <a:latin typeface="Cambria Math" panose="02040503050406030204" pitchFamily="18" charset="0"/>
+                                    <a:ea typeface="Calibri" panose="020F0502020204030204" pitchFamily="34" charset="0"/>
+                                    <a:cs typeface="Times New Roman" panose="02020603050405020304" pitchFamily="18" charset="0"/>
+                                  </a:rPr>
+                                  <m:t>𝜃</m:t>
+                                </m:r>
+                              </m:e>
+                            </m:acc>
+                          </m:oMath>
+                        </a14:m>
+                        <a:r>
+                          <a:rPr lang="fr-FR" sz="1400" dirty="0">
+                            <a:solidFill>
+                              <a:srgbClr val="036DBF"/>
+                            </a:solidFill>
+                            <a:effectLst/>
+                            <a:ea typeface="Calibri" panose="020F0502020204030204" pitchFamily="34" charset="0"/>
+                            <a:cs typeface="Times New Roman" panose="02020603050405020304" pitchFamily="18" charset="0"/>
+                          </a:rPr>
+                          <a:t> </a:t>
+                        </a:r>
+                      </a:p>
+                    </p:txBody>
+                  </p:sp>
+                </mc:Choice>
+                <mc:Fallback>
+                  <p:sp>
+                    <p:nvSpPr>
+                      <p:cNvPr id="29" name="Zone de texte 153"/>
+                      <p:cNvSpPr txBox="1">
+                        <a:spLocks noRot="1" noChangeAspect="1" noMove="1" noResize="1" noEditPoints="1" noAdjustHandles="1" noChangeArrowheads="1" noChangeShapeType="1" noTextEdit="1"/>
+                      </p:cNvSpPr>
+                      <p:nvPr/>
+                    </p:nvSpPr>
+                    <p:spPr>
+                      <a:xfrm>
+                        <a:off x="6018316" y="3454284"/>
+                        <a:ext cx="301748" cy="274650"/>
+                      </a:xfrm>
+                      <a:prstGeom prst="rect">
+                        <a:avLst/>
+                      </a:prstGeom>
+                      <a:blipFill rotWithShape="0">
+                        <a:blip r:embed="rId17"/>
+                        <a:stretch>
+                          <a:fillRect b="-4444"/>
+                        </a:stretch>
+                      </a:blipFill>
+                      <a:ln w="6350">
+                        <a:noFill/>
+                        <a:prstDash val="sysDash"/>
+                      </a:ln>
+                      <a:effectLst/>
+                    </p:spPr>
+                    <p:txBody>
+                      <a:bodyPr/>
+                      <a:lstStyle/>
+                      <a:p>
+                        <a:r>
+                          <a:rPr lang="fr-FR">
+                            <a:noFill/>
+                          </a:rPr>
+                          <a:t> </a:t>
+                        </a:r>
+                      </a:p>
+                    </p:txBody>
+                  </p:sp>
+                </mc:Fallback>
+              </mc:AlternateContent>
+            </p:grpSp>
+            <p:grpSp>
+              <p:nvGrpSpPr>
+                <p:cNvPr id="25" name="Groupe 24"/>
+                <p:cNvGrpSpPr/>
+                <p:nvPr/>
+              </p:nvGrpSpPr>
+              <p:grpSpPr>
+                <a:xfrm>
+                  <a:off x="5693428" y="2448282"/>
+                  <a:ext cx="364078" cy="409534"/>
+                  <a:chOff x="3778458" y="2054982"/>
+                  <a:chExt cx="364078" cy="409534"/>
+                </a:xfrm>
+              </p:grpSpPr>
+              <p:sp>
+                <p:nvSpPr>
+                  <p:cNvPr id="26" name="Arc 25"/>
+                  <p:cNvSpPr/>
+                  <p:nvPr/>
+                </p:nvSpPr>
+                <p:spPr>
+                  <a:xfrm>
+                    <a:off x="3852024" y="2217442"/>
+                    <a:ext cx="290512" cy="247074"/>
+                  </a:xfrm>
+                  <a:prstGeom prst="arc">
+                    <a:avLst>
+                      <a:gd name="adj1" fmla="val 16200000"/>
+                      <a:gd name="adj2" fmla="val 2933405"/>
+                    </a:avLst>
+                  </a:prstGeom>
+                  <a:ln w="12700">
+                    <a:solidFill>
+                      <a:srgbClr val="036DBF"/>
+                    </a:solidFill>
+                    <a:tailEnd type="triangle"/>
+                  </a:ln>
+                </p:spPr>
+                <p:style>
+                  <a:lnRef idx="1">
+                    <a:schemeClr val="accent1"/>
+                  </a:lnRef>
+                  <a:fillRef idx="0">
+                    <a:schemeClr val="accent1"/>
+                  </a:fillRef>
+                  <a:effectRef idx="0">
+                    <a:schemeClr val="accent1"/>
+                  </a:effectRef>
+                  <a:fontRef idx="minor">
+                    <a:schemeClr val="tx1"/>
+                  </a:fontRef>
+                </p:style>
+                <p:txBody>
+                  <a:bodyPr rtlCol="0" anchor="ctr"/>
+                  <a:lstStyle/>
+                  <a:p>
+                    <a:pPr algn="ctr"/>
+                    <a:endParaRPr lang="fr-FR"/>
+                  </a:p>
+                </p:txBody>
+              </p:sp>
+              <mc:AlternateContent xmlns:mc="http://schemas.openxmlformats.org/markup-compatibility/2006">
+                <mc:Choice xmlns:a14="http://schemas.microsoft.com/office/drawing/2010/main" Requires="a14">
+                  <p:sp>
+                    <p:nvSpPr>
+                      <p:cNvPr id="27" name="Zone de texte 153"/>
+                      <p:cNvSpPr txBox="1"/>
+                      <p:nvPr/>
+                    </p:nvSpPr>
+                    <p:spPr>
+                      <a:xfrm>
+                        <a:off x="3778458" y="2054982"/>
+                        <a:ext cx="301748" cy="274650"/>
+                      </a:xfrm>
+                      <a:prstGeom prst="rect">
+                        <a:avLst/>
+                      </a:prstGeom>
+                      <a:noFill/>
+                      <a:ln w="6350">
+                        <a:noFill/>
+                        <a:prstDash val="sysDash"/>
+                      </a:ln>
+                      <a:effectLst/>
+                    </p:spPr>
+                    <p:style>
+                      <a:lnRef idx="0">
+                        <a:schemeClr val="accent1"/>
+                      </a:lnRef>
+                      <a:fillRef idx="0">
+                        <a:schemeClr val="accent1"/>
+                      </a:fillRef>
+                      <a:effectRef idx="0">
+                        <a:schemeClr val="accent1"/>
+                      </a:effectRef>
+                      <a:fontRef idx="minor">
+                        <a:schemeClr val="dk1"/>
+                      </a:fontRef>
+                    </p:style>
+                    <p:txBody>
+                      <a:bodyPr rot="0" spcFirstLastPara="0" vert="horz" wrap="square" lIns="91440" tIns="45720" rIns="91440" bIns="45720" numCol="1" spcCol="0" rtlCol="0" fromWordArt="0" anchor="t" anchorCtr="0" forceAA="0" compatLnSpc="1">
+                        <a:prstTxWarp prst="textNoShape">
+                          <a:avLst/>
+                        </a:prstTxWarp>
+                        <a:noAutofit/>
+                      </a:bodyPr>
+                      <a:lstStyle/>
+                      <a:p>
+                        <a:pPr>
+                          <a:lnSpc>
+                            <a:spcPct val="107000"/>
+                          </a:lnSpc>
+                          <a:spcAft>
+                            <a:spcPts val="800"/>
+                          </a:spcAft>
+                        </a:pPr>
+                        <a14:m>
+                          <m:oMath xmlns:m="http://schemas.openxmlformats.org/officeDocument/2006/math">
+                            <m:acc>
+                              <m:accPr>
+                                <m:chr m:val="̃"/>
+                                <m:ctrlPr>
+                                  <a:rPr lang="fr-FR" sz="1400" b="0" i="1" smtClean="0">
+                                    <a:solidFill>
+                                      <a:srgbClr val="036DBF"/>
+                                    </a:solidFill>
+                                    <a:effectLst/>
+                                    <a:latin typeface="Cambria Math" panose="02040503050406030204" pitchFamily="18" charset="0"/>
+                                    <a:cs typeface="Times New Roman" panose="02020603050405020304" pitchFamily="18" charset="0"/>
+                                  </a:rPr>
+                                </m:ctrlPr>
+                              </m:accPr>
+                              <m:e>
+                                <m:r>
+                                  <a:rPr lang="fr-FR" sz="1400" i="1">
+                                    <a:solidFill>
+                                      <a:srgbClr val="036DBF"/>
+                                    </a:solidFill>
+                                    <a:latin typeface="Cambria Math" panose="02040503050406030204" pitchFamily="18" charset="0"/>
+                                    <a:ea typeface="Calibri" panose="020F0502020204030204" pitchFamily="34" charset="0"/>
+                                    <a:cs typeface="Times New Roman" panose="02020603050405020304" pitchFamily="18" charset="0"/>
+                                  </a:rPr>
+                                  <m:t>𝜓</m:t>
+                                </m:r>
+                              </m:e>
+                            </m:acc>
+                          </m:oMath>
+                        </a14:m>
+                        <a:r>
+                          <a:rPr lang="fr-FR" sz="1400" dirty="0">
+                            <a:solidFill>
+                              <a:srgbClr val="036DBF"/>
+                            </a:solidFill>
+                            <a:effectLst/>
+                            <a:ea typeface="Calibri" panose="020F0502020204030204" pitchFamily="34" charset="0"/>
+                            <a:cs typeface="Times New Roman" panose="02020603050405020304" pitchFamily="18" charset="0"/>
+                          </a:rPr>
+                          <a:t> </a:t>
+                        </a:r>
+                      </a:p>
+                    </p:txBody>
+                  </p:sp>
+                </mc:Choice>
+                <mc:Fallback>
+                  <p:sp>
+                    <p:nvSpPr>
+                      <p:cNvPr id="27" name="Zone de texte 153"/>
+                      <p:cNvSpPr txBox="1">
+                        <a:spLocks noRot="1" noChangeAspect="1" noMove="1" noResize="1" noEditPoints="1" noAdjustHandles="1" noChangeArrowheads="1" noChangeShapeType="1" noTextEdit="1"/>
+                      </p:cNvSpPr>
+                      <p:nvPr/>
+                    </p:nvSpPr>
+                    <p:spPr>
+                      <a:xfrm>
+                        <a:off x="3778458" y="2054982"/>
+                        <a:ext cx="301748" cy="274650"/>
+                      </a:xfrm>
+                      <a:prstGeom prst="rect">
+                        <a:avLst/>
+                      </a:prstGeom>
+                      <a:blipFill rotWithShape="0">
+                        <a:blip r:embed="rId18"/>
+                        <a:stretch>
+                          <a:fillRect r="-2000" b="-24444"/>
+                        </a:stretch>
+                      </a:blipFill>
+                      <a:ln w="6350">
+                        <a:noFill/>
+                        <a:prstDash val="sysDash"/>
+                      </a:ln>
+                      <a:effectLst/>
+                    </p:spPr>
+                    <p:txBody>
+                      <a:bodyPr/>
+                      <a:lstStyle/>
+                      <a:p>
+                        <a:r>
+                          <a:rPr lang="fr-FR">
+                            <a:noFill/>
+                          </a:rPr>
+                          <a:t> </a:t>
+                        </a:r>
+                      </a:p>
+                    </p:txBody>
+                  </p:sp>
+                </mc:Fallback>
+              </mc:AlternateContent>
+            </p:grpSp>
+            <p:grpSp>
+              <p:nvGrpSpPr>
+                <p:cNvPr id="38" name="Groupe 37"/>
+                <p:cNvGrpSpPr/>
+                <p:nvPr/>
+              </p:nvGrpSpPr>
+              <p:grpSpPr>
+                <a:xfrm>
+                  <a:off x="5230093" y="3112173"/>
+                  <a:ext cx="583233" cy="351065"/>
+                  <a:chOff x="1358181" y="5560770"/>
+                  <a:chExt cx="583233" cy="351065"/>
+                </a:xfrm>
+              </p:grpSpPr>
+              <p:cxnSp>
+                <p:nvCxnSpPr>
+                  <p:cNvPr id="19" name="Connecteur droit avec flèche 18"/>
+                  <p:cNvCxnSpPr/>
+                  <p:nvPr/>
+                </p:nvCxnSpPr>
+                <p:spPr>
+                  <a:xfrm>
+                    <a:off x="1612802" y="5560770"/>
+                    <a:ext cx="328612" cy="351065"/>
+                  </a:xfrm>
+                  <a:prstGeom prst="straightConnector1">
+                    <a:avLst/>
+                  </a:prstGeom>
+                  <a:ln w="12700">
+                    <a:solidFill>
+                      <a:srgbClr val="036DBF"/>
+                    </a:solidFill>
+                    <a:prstDash val="solid"/>
+                    <a:tailEnd type="triangle"/>
+                  </a:ln>
+                </p:spPr>
+                <p:style>
+                  <a:lnRef idx="1">
+                    <a:schemeClr val="accent1"/>
+                  </a:lnRef>
+                  <a:fillRef idx="0">
+                    <a:schemeClr val="accent1"/>
+                  </a:fillRef>
+                  <a:effectRef idx="0">
+                    <a:schemeClr val="accent1"/>
+                  </a:effectRef>
+                  <a:fontRef idx="minor">
+                    <a:schemeClr val="tx1"/>
+                  </a:fontRef>
+                </p:style>
+              </p:cxnSp>
+              <mc:AlternateContent xmlns:mc="http://schemas.openxmlformats.org/markup-compatibility/2006">
+                <mc:Choice xmlns:a14="http://schemas.microsoft.com/office/drawing/2010/main" Requires="a14">
+                  <p:sp>
+                    <p:nvSpPr>
+                      <p:cNvPr id="21" name="Zone de texte 153"/>
+                      <p:cNvSpPr txBox="1"/>
+                      <p:nvPr/>
+                    </p:nvSpPr>
+                    <p:spPr>
+                      <a:xfrm>
+                        <a:off x="1358181" y="5630491"/>
+                        <a:ext cx="301748" cy="274650"/>
+                      </a:xfrm>
+                      <a:prstGeom prst="rect">
+                        <a:avLst/>
+                      </a:prstGeom>
+                      <a:noFill/>
+                      <a:ln w="6350">
+                        <a:noFill/>
+                        <a:prstDash val="sysDash"/>
+                      </a:ln>
+                      <a:effectLst/>
+                    </p:spPr>
+                    <p:style>
+                      <a:lnRef idx="0">
+                        <a:schemeClr val="accent1"/>
+                      </a:lnRef>
+                      <a:fillRef idx="0">
+                        <a:schemeClr val="accent1"/>
+                      </a:fillRef>
+                      <a:effectRef idx="0">
+                        <a:schemeClr val="accent1"/>
+                      </a:effectRef>
+                      <a:fontRef idx="minor">
+                        <a:schemeClr val="dk1"/>
+                      </a:fontRef>
+                    </p:style>
+                    <p:txBody>
+                      <a:bodyPr rot="0" spcFirstLastPara="0" vert="horz" wrap="square" lIns="91440" tIns="45720" rIns="91440" bIns="45720" numCol="1" spcCol="0" rtlCol="0" fromWordArt="0" anchor="t" anchorCtr="0" forceAA="0" compatLnSpc="1">
+                        <a:prstTxWarp prst="textNoShape">
+                          <a:avLst/>
+                        </a:prstTxWarp>
+                        <a:noAutofit/>
+                      </a:bodyPr>
+                      <a:lstStyle/>
+                      <a:p>
+                        <a:pPr>
+                          <a:lnSpc>
+                            <a:spcPct val="107000"/>
+                          </a:lnSpc>
+                          <a:spcAft>
+                            <a:spcPts val="800"/>
+                          </a:spcAft>
+                        </a:pPr>
+                        <a14:m>
+                          <m:oMath xmlns:m="http://schemas.openxmlformats.org/officeDocument/2006/math">
+                            <m:r>
+                              <a:rPr lang="fr-FR" sz="1400" i="1" smtClean="0">
+                                <a:solidFill>
+                                  <a:schemeClr val="tx1"/>
+                                </a:solidFill>
+                                <a:latin typeface="Cambria Math" panose="02040503050406030204" pitchFamily="18" charset="0"/>
+                                <a:ea typeface="Calibri" panose="020F0502020204030204" pitchFamily="34" charset="0"/>
+                                <a:cs typeface="Times New Roman" panose="02020603050405020304" pitchFamily="18" charset="0"/>
+                              </a:rPr>
+                              <m:t>𝑢</m:t>
+                            </m:r>
+                            <m:r>
+                              <a:rPr lang="fr-FR" sz="1400" i="1">
+                                <a:solidFill>
+                                  <a:srgbClr val="036DBF"/>
+                                </a:solidFill>
+                                <a:latin typeface="Cambria Math" panose="02040503050406030204" pitchFamily="18" charset="0"/>
+                                <a:ea typeface="Calibri" panose="020F0502020204030204" pitchFamily="34" charset="0"/>
+                                <a:cs typeface="Times New Roman" panose="02020603050405020304" pitchFamily="18" charset="0"/>
+                              </a:rPr>
+                              <m:t> </m:t>
+                            </m:r>
+                          </m:oMath>
+                        </a14:m>
+                        <a:r>
+                          <a:rPr lang="fr-FR" sz="1400" dirty="0">
+                            <a:solidFill>
+                              <a:srgbClr val="036DBF"/>
+                            </a:solidFill>
+                            <a:effectLst/>
+                            <a:ea typeface="Calibri" panose="020F0502020204030204" pitchFamily="34" charset="0"/>
+                            <a:cs typeface="Times New Roman" panose="02020603050405020304" pitchFamily="18" charset="0"/>
+                          </a:rPr>
+                          <a:t> </a:t>
+                        </a:r>
+                        <a:endParaRPr lang="fr-FR" sz="1400" dirty="0">
+                          <a:effectLst/>
+                          <a:ea typeface="Calibri" panose="020F0502020204030204" pitchFamily="34" charset="0"/>
+                          <a:cs typeface="Times New Roman" panose="02020603050405020304" pitchFamily="18" charset="0"/>
+                        </a:endParaRPr>
+                      </a:p>
+                    </p:txBody>
+                  </p:sp>
+                </mc:Choice>
+                <mc:Fallback>
+                  <p:sp>
+                    <p:nvSpPr>
+                      <p:cNvPr id="21" name="Zone de texte 153"/>
+                      <p:cNvSpPr txBox="1">
+                        <a:spLocks noRot="1" noChangeAspect="1" noMove="1" noResize="1" noEditPoints="1" noAdjustHandles="1" noChangeArrowheads="1" noChangeShapeType="1" noTextEdit="1"/>
+                      </p:cNvSpPr>
+                      <p:nvPr/>
+                    </p:nvSpPr>
+                    <p:spPr>
+                      <a:xfrm>
+                        <a:off x="1358181" y="5630491"/>
+                        <a:ext cx="301748" cy="274650"/>
+                      </a:xfrm>
+                      <a:prstGeom prst="rect">
+                        <a:avLst/>
+                      </a:prstGeom>
+                      <a:blipFill rotWithShape="0">
+                        <a:blip r:embed="rId19"/>
+                        <a:stretch>
+                          <a:fillRect/>
+                        </a:stretch>
+                      </a:blipFill>
+                      <a:ln w="6350">
+                        <a:noFill/>
+                        <a:prstDash val="sysDash"/>
+                      </a:ln>
+                      <a:effectLst/>
+                    </p:spPr>
+                    <p:txBody>
+                      <a:bodyPr/>
+                      <a:lstStyle/>
+                      <a:p>
+                        <a:r>
+                          <a:rPr lang="fr-FR">
+                            <a:noFill/>
+                          </a:rPr>
+                          <a:t> </a:t>
+                        </a:r>
+                      </a:p>
+                    </p:txBody>
+                  </p:sp>
+                </mc:Fallback>
+              </mc:AlternateContent>
+            </p:grpSp>
+            <p:grpSp>
+              <p:nvGrpSpPr>
+                <p:cNvPr id="41" name="Groupe 40"/>
+                <p:cNvGrpSpPr/>
+                <p:nvPr/>
+              </p:nvGrpSpPr>
+              <p:grpSpPr>
+                <a:xfrm>
+                  <a:off x="5429292" y="2730669"/>
+                  <a:ext cx="366065" cy="373767"/>
+                  <a:chOff x="1702998" y="5240832"/>
+                  <a:chExt cx="366065" cy="373767"/>
+                </a:xfrm>
+              </p:grpSpPr>
+              <p:cxnSp>
+                <p:nvCxnSpPr>
+                  <p:cNvPr id="20" name="Connecteur droit avec flèche 19"/>
+                  <p:cNvCxnSpPr/>
+                  <p:nvPr/>
+                </p:nvCxnSpPr>
+                <p:spPr>
+                  <a:xfrm flipV="1">
+                    <a:off x="1757168" y="5340162"/>
+                    <a:ext cx="311895" cy="274437"/>
+                  </a:xfrm>
+                  <a:prstGeom prst="straightConnector1">
+                    <a:avLst/>
+                  </a:prstGeom>
+                  <a:ln w="12700">
+                    <a:solidFill>
+                      <a:srgbClr val="036DBF"/>
+                    </a:solidFill>
+                    <a:prstDash val="solid"/>
+                    <a:tailEnd type="triangle"/>
+                  </a:ln>
+                </p:spPr>
+                <p:style>
+                  <a:lnRef idx="1">
+                    <a:schemeClr val="accent1"/>
+                  </a:lnRef>
+                  <a:fillRef idx="0">
+                    <a:schemeClr val="accent1"/>
+                  </a:fillRef>
+                  <a:effectRef idx="0">
+                    <a:schemeClr val="accent1"/>
+                  </a:effectRef>
+                  <a:fontRef idx="minor">
+                    <a:schemeClr val="tx1"/>
+                  </a:fontRef>
+                </p:style>
+              </p:cxnSp>
+              <mc:AlternateContent xmlns:mc="http://schemas.openxmlformats.org/markup-compatibility/2006">
+                <mc:Choice xmlns:a14="http://schemas.microsoft.com/office/drawing/2010/main" Requires="a14">
+                  <p:sp>
+                    <p:nvSpPr>
+                      <p:cNvPr id="22" name="Zone de texte 153"/>
+                      <p:cNvSpPr txBox="1"/>
+                      <p:nvPr/>
+                    </p:nvSpPr>
+                    <p:spPr>
+                      <a:xfrm>
+                        <a:off x="1702998" y="5240832"/>
+                        <a:ext cx="301748" cy="274650"/>
+                      </a:xfrm>
+                      <a:prstGeom prst="rect">
+                        <a:avLst/>
+                      </a:prstGeom>
+                      <a:noFill/>
+                      <a:ln w="6350">
+                        <a:noFill/>
+                        <a:prstDash val="sysDash"/>
+                      </a:ln>
+                      <a:effectLst/>
+                    </p:spPr>
+                    <p:style>
+                      <a:lnRef idx="0">
+                        <a:schemeClr val="accent1"/>
+                      </a:lnRef>
+                      <a:fillRef idx="0">
+                        <a:schemeClr val="accent1"/>
+                      </a:fillRef>
+                      <a:effectRef idx="0">
+                        <a:schemeClr val="accent1"/>
+                      </a:effectRef>
+                      <a:fontRef idx="minor">
+                        <a:schemeClr val="dk1"/>
+                      </a:fontRef>
+                    </p:style>
+                    <p:txBody>
+                      <a:bodyPr rot="0" spcFirstLastPara="0" vert="horz" wrap="square" lIns="91440" tIns="45720" rIns="91440" bIns="45720" numCol="1" spcCol="0" rtlCol="0" fromWordArt="0" anchor="t" anchorCtr="0" forceAA="0" compatLnSpc="1">
+                        <a:prstTxWarp prst="textNoShape">
+                          <a:avLst/>
+                        </a:prstTxWarp>
+                        <a:noAutofit/>
+                      </a:bodyPr>
+                      <a:lstStyle/>
+                      <a:p>
+                        <a:pPr>
+                          <a:lnSpc>
+                            <a:spcPct val="107000"/>
+                          </a:lnSpc>
+                          <a:spcAft>
+                            <a:spcPts val="800"/>
+                          </a:spcAft>
+                        </a:pPr>
+                        <a14:m>
+                          <m:oMath xmlns:m="http://schemas.openxmlformats.org/officeDocument/2006/math">
+                            <m:acc>
+                              <m:accPr>
+                                <m:chr m:val="̃"/>
+                                <m:ctrlPr>
+                                  <a:rPr lang="fr-FR" sz="1400" b="0" i="1" smtClean="0">
+                                    <a:solidFill>
+                                      <a:srgbClr val="036DBF"/>
+                                    </a:solidFill>
+                                    <a:effectLst/>
+                                    <a:latin typeface="Cambria Math" panose="02040503050406030204" pitchFamily="18" charset="0"/>
+                                    <a:cs typeface="Times New Roman" panose="02020603050405020304" pitchFamily="18" charset="0"/>
+                                  </a:rPr>
+                                </m:ctrlPr>
+                              </m:accPr>
+                              <m:e>
+                                <m:r>
+                                  <a:rPr lang="fr-FR" sz="1400" i="1" smtClean="0">
+                                    <a:solidFill>
+                                      <a:srgbClr val="036DBF"/>
+                                    </a:solidFill>
+                                    <a:latin typeface="Cambria Math" panose="02040503050406030204" pitchFamily="18" charset="0"/>
+                                    <a:ea typeface="Calibri" panose="020F0502020204030204" pitchFamily="34" charset="0"/>
+                                    <a:cs typeface="Times New Roman" panose="02020603050405020304" pitchFamily="18" charset="0"/>
+                                  </a:rPr>
+                                  <m:t>𝑣</m:t>
+                                </m:r>
+                              </m:e>
+                            </m:acc>
+                          </m:oMath>
+                        </a14:m>
+                        <a:r>
+                          <a:rPr lang="fr-FR" sz="1400" dirty="0">
+                            <a:solidFill>
+                              <a:srgbClr val="036DBF"/>
+                            </a:solidFill>
+                            <a:effectLst/>
+                            <a:ea typeface="Calibri" panose="020F0502020204030204" pitchFamily="34" charset="0"/>
+                            <a:cs typeface="Times New Roman" panose="02020603050405020304" pitchFamily="18" charset="0"/>
+                          </a:rPr>
+                          <a:t> </a:t>
+                        </a:r>
+                      </a:p>
+                    </p:txBody>
+                  </p:sp>
+                </mc:Choice>
+                <mc:Fallback>
+                  <p:sp>
+                    <p:nvSpPr>
+                      <p:cNvPr id="22" name="Zone de texte 153"/>
+                      <p:cNvSpPr txBox="1">
+                        <a:spLocks noRot="1" noChangeAspect="1" noMove="1" noResize="1" noEditPoints="1" noAdjustHandles="1" noChangeArrowheads="1" noChangeShapeType="1" noTextEdit="1"/>
+                      </p:cNvSpPr>
+                      <p:nvPr/>
+                    </p:nvSpPr>
+                    <p:spPr>
+                      <a:xfrm>
+                        <a:off x="1702998" y="5240832"/>
+                        <a:ext cx="301748" cy="274650"/>
+                      </a:xfrm>
+                      <a:prstGeom prst="rect">
+                        <a:avLst/>
+                      </a:prstGeom>
+                      <a:blipFill rotWithShape="0">
+                        <a:blip r:embed="rId20"/>
+                        <a:stretch>
+                          <a:fillRect/>
+                        </a:stretch>
+                      </a:blipFill>
+                      <a:ln w="6350">
+                        <a:noFill/>
+                        <a:prstDash val="sysDash"/>
+                      </a:ln>
+                      <a:effectLst/>
+                    </p:spPr>
+                    <p:txBody>
+                      <a:bodyPr/>
+                      <a:lstStyle/>
+                      <a:p>
+                        <a:r>
+                          <a:rPr lang="fr-FR">
+                            <a:noFill/>
+                          </a:rPr>
+                          <a:t> </a:t>
+                        </a:r>
+                      </a:p>
+                    </p:txBody>
+                  </p:sp>
+                </mc:Fallback>
+              </mc:AlternateContent>
+            </p:grpSp>
+          </p:grpSp>
+          <p:cxnSp>
+            <p:nvCxnSpPr>
+              <p:cNvPr id="44" name="Connecteur droit avec flèche 43"/>
+              <p:cNvCxnSpPr/>
+              <p:nvPr/>
+            </p:nvCxnSpPr>
+            <p:spPr>
+              <a:xfrm>
+                <a:off x="5486234" y="3104436"/>
+                <a:ext cx="0" cy="624498"/>
+              </a:xfrm>
+              <a:prstGeom prst="straightConnector1">
+                <a:avLst/>
+              </a:prstGeom>
+              <a:ln w="12700">
+                <a:solidFill>
+                  <a:schemeClr val="tx1"/>
+                </a:solidFill>
+                <a:prstDash val="solid"/>
+                <a:tailEnd type="triangle"/>
+              </a:ln>
+            </p:spPr>
+            <p:style>
+              <a:lnRef idx="1">
+                <a:schemeClr val="accent1"/>
+              </a:lnRef>
+              <a:fillRef idx="0">
+                <a:schemeClr val="accent1"/>
+              </a:fillRef>
+              <a:effectRef idx="0">
+                <a:schemeClr val="accent1"/>
+              </a:effectRef>
+              <a:fontRef idx="minor">
+                <a:schemeClr val="tx1"/>
+              </a:fontRef>
+            </p:style>
+          </p:cxnSp>
+          <p:cxnSp>
+            <p:nvCxnSpPr>
+              <p:cNvPr id="46" name="Connecteur droit avec flèche 45"/>
+              <p:cNvCxnSpPr/>
+              <p:nvPr/>
+            </p:nvCxnSpPr>
+            <p:spPr>
+              <a:xfrm>
+                <a:off x="5473784" y="3100067"/>
+                <a:ext cx="744862" cy="8671"/>
+              </a:xfrm>
+              <a:prstGeom prst="straightConnector1">
+                <a:avLst/>
+              </a:prstGeom>
+              <a:ln w="12700">
+                <a:solidFill>
+                  <a:schemeClr val="tx1"/>
+                </a:solidFill>
+                <a:prstDash val="solid"/>
+                <a:tailEnd type="triangle"/>
+              </a:ln>
+            </p:spPr>
+            <p:style>
+              <a:lnRef idx="1">
+                <a:schemeClr val="accent1"/>
+              </a:lnRef>
+              <a:fillRef idx="0">
+                <a:schemeClr val="accent1"/>
+              </a:fillRef>
+              <a:effectRef idx="0">
+                <a:schemeClr val="accent1"/>
+              </a:effectRef>
+              <a:fontRef idx="minor">
+                <a:schemeClr val="tx1"/>
+              </a:fontRef>
+            </p:style>
+          </p:cxnSp>
+          <mc:AlternateContent xmlns:mc="http://schemas.openxmlformats.org/markup-compatibility/2006">
+            <mc:Choice xmlns:a14="http://schemas.microsoft.com/office/drawing/2010/main" Requires="a14">
+              <p:sp>
+                <p:nvSpPr>
+                  <p:cNvPr id="51" name="Zone de texte 153"/>
+                  <p:cNvSpPr txBox="1"/>
+                  <p:nvPr/>
+                </p:nvSpPr>
+                <p:spPr>
+                  <a:xfrm>
+                    <a:off x="5991451" y="2848764"/>
+                    <a:ext cx="301748" cy="274650"/>
+                  </a:xfrm>
+                  <a:prstGeom prst="rect">
+                    <a:avLst/>
+                  </a:prstGeom>
+                  <a:noFill/>
+                  <a:ln w="6350">
+                    <a:noFill/>
+                    <a:prstDash val="sysDash"/>
+                  </a:ln>
+                  <a:effectLst/>
+                </p:spPr>
+                <p:style>
+                  <a:lnRef idx="0">
+                    <a:schemeClr val="accent1"/>
+                  </a:lnRef>
+                  <a:fillRef idx="0">
+                    <a:schemeClr val="accent1"/>
+                  </a:fillRef>
+                  <a:effectRef idx="0">
+                    <a:schemeClr val="accent1"/>
+                  </a:effectRef>
+                  <a:fontRef idx="minor">
+                    <a:schemeClr val="dk1"/>
+                  </a:fontRef>
+                </p:style>
+                <p:txBody>
+                  <a:bodyPr rot="0" spcFirstLastPara="0" vert="horz" wrap="square" lIns="91440" tIns="45720" rIns="91440" bIns="45720" numCol="1" spcCol="0" rtlCol="0" fromWordArt="0" anchor="t" anchorCtr="0" forceAA="0" compatLnSpc="1">
+                    <a:prstTxWarp prst="textNoShape">
+                      <a:avLst/>
+                    </a:prstTxWarp>
+                    <a:noAutofit/>
+                  </a:bodyPr>
+                  <a:lstStyle/>
+                  <a:p>
+                    <a:pPr>
+                      <a:lnSpc>
+                        <a:spcPct val="107000"/>
+                      </a:lnSpc>
+                      <a:spcAft>
+                        <a:spcPts val="800"/>
+                      </a:spcAft>
+                    </a:pPr>
+                    <a14:m>
+                      <m:oMath xmlns:m="http://schemas.openxmlformats.org/officeDocument/2006/math">
+                        <m:r>
+                          <a:rPr lang="fr-FR" sz="1400" i="1" smtClean="0">
+                            <a:solidFill>
+                              <a:schemeClr val="tx1"/>
+                            </a:solidFill>
+                            <a:latin typeface="Cambria Math" panose="02040503050406030204" pitchFamily="18" charset="0"/>
+                            <a:ea typeface="Calibri" panose="020F0502020204030204" pitchFamily="34" charset="0"/>
+                            <a:cs typeface="Times New Roman" panose="02020603050405020304" pitchFamily="18" charset="0"/>
+                          </a:rPr>
+                          <m:t>𝑣</m:t>
+                        </m:r>
+                        <m:r>
+                          <a:rPr lang="fr-FR" sz="1400" i="1">
+                            <a:solidFill>
+                              <a:srgbClr val="036DBF"/>
+                            </a:solidFill>
+                            <a:latin typeface="Cambria Math" panose="02040503050406030204" pitchFamily="18" charset="0"/>
+                            <a:ea typeface="Calibri" panose="020F0502020204030204" pitchFamily="34" charset="0"/>
+                            <a:cs typeface="Times New Roman" panose="02020603050405020304" pitchFamily="18" charset="0"/>
+                          </a:rPr>
+                          <m:t> </m:t>
+                        </m:r>
+                      </m:oMath>
+                    </a14:m>
+                    <a:r>
+                      <a:rPr lang="fr-FR" sz="1400" dirty="0">
+                        <a:solidFill>
+                          <a:srgbClr val="036DBF"/>
+                        </a:solidFill>
+                        <a:effectLst/>
+                        <a:ea typeface="Calibri" panose="020F0502020204030204" pitchFamily="34" charset="0"/>
+                        <a:cs typeface="Times New Roman" panose="02020603050405020304" pitchFamily="18" charset="0"/>
+                      </a:rPr>
+                      <a:t> </a:t>
+                    </a:r>
+                  </a:p>
+                </p:txBody>
+              </p:sp>
+            </mc:Choice>
+            <mc:Fallback>
+              <p:sp>
+                <p:nvSpPr>
+                  <p:cNvPr id="51" name="Zone de texte 153"/>
+                  <p:cNvSpPr txBox="1">
+                    <a:spLocks noRot="1" noChangeAspect="1" noMove="1" noResize="1" noEditPoints="1" noAdjustHandles="1" noChangeArrowheads="1" noChangeShapeType="1" noTextEdit="1"/>
+                  </p:cNvSpPr>
+                  <p:nvPr/>
+                </p:nvSpPr>
+                <p:spPr>
+                  <a:xfrm>
+                    <a:off x="5991451" y="2848764"/>
+                    <a:ext cx="301748" cy="274650"/>
+                  </a:xfrm>
+                  <a:prstGeom prst="rect">
+                    <a:avLst/>
+                  </a:prstGeom>
+                  <a:blipFill rotWithShape="0">
+                    <a:blip r:embed="rId21"/>
+                    <a:stretch>
+                      <a:fillRect/>
+                    </a:stretch>
+                  </a:blipFill>
+                  <a:ln w="6350">
+                    <a:noFill/>
+                    <a:prstDash val="sysDash"/>
+                  </a:ln>
+                  <a:effectLst/>
+                </p:spPr>
+                <p:txBody>
+                  <a:bodyPr/>
+                  <a:lstStyle/>
+                  <a:p>
+                    <a:r>
+                      <a:rPr lang="fr-FR">
+                        <a:noFill/>
+                      </a:rPr>
+                      <a:t> </a:t>
+                    </a:r>
+                  </a:p>
+                </p:txBody>
+              </p:sp>
+            </mc:Fallback>
+          </mc:AlternateContent>
+          <p:grpSp>
+            <p:nvGrpSpPr>
+              <p:cNvPr id="55" name="Groupe 54"/>
+              <p:cNvGrpSpPr/>
+              <p:nvPr/>
+            </p:nvGrpSpPr>
+            <p:grpSpPr>
+              <a:xfrm>
+                <a:off x="5117467" y="3317981"/>
+                <a:ext cx="479854" cy="345609"/>
+                <a:chOff x="5117467" y="3317981"/>
+                <a:chExt cx="479854" cy="345609"/>
+              </a:xfrm>
+            </p:grpSpPr>
+            <p:sp>
+              <p:nvSpPr>
+                <p:cNvPr id="52" name="Arc 51"/>
+                <p:cNvSpPr/>
+                <p:nvPr/>
+              </p:nvSpPr>
+              <p:spPr>
+                <a:xfrm rot="6652779">
+                  <a:off x="5328528" y="3339700"/>
+                  <a:ext cx="290512" cy="247074"/>
+                </a:xfrm>
+                <a:prstGeom prst="arc">
+                  <a:avLst>
+                    <a:gd name="adj1" fmla="val 16200000"/>
+                    <a:gd name="adj2" fmla="val 2933405"/>
+                  </a:avLst>
+                </a:prstGeom>
+                <a:ln w="12700">
+                  <a:solidFill>
+                    <a:schemeClr val="tx1"/>
+                  </a:solidFill>
+                  <a:tailEnd type="triangle"/>
+                </a:ln>
+              </p:spPr>
+              <p:style>
+                <a:lnRef idx="1">
+                  <a:schemeClr val="accent1"/>
+                </a:lnRef>
+                <a:fillRef idx="0">
+                  <a:schemeClr val="accent1"/>
+                </a:fillRef>
+                <a:effectRef idx="0">
+                  <a:schemeClr val="accent1"/>
+                </a:effectRef>
+                <a:fontRef idx="minor">
+                  <a:schemeClr val="tx1"/>
+                </a:fontRef>
+              </p:style>
+              <p:txBody>
+                <a:bodyPr rtlCol="0" anchor="ctr"/>
+                <a:lstStyle/>
+                <a:p>
+                  <a:pPr algn="ctr"/>
+                  <a:endParaRPr lang="fr-FR"/>
+                </a:p>
+              </p:txBody>
+            </p:sp>
+            <mc:AlternateContent xmlns:mc="http://schemas.openxmlformats.org/markup-compatibility/2006">
+              <mc:Choice xmlns:a14="http://schemas.microsoft.com/office/drawing/2010/main" Requires="a14">
+                <p:sp>
+                  <p:nvSpPr>
+                    <p:cNvPr id="53" name="Zone de texte 153"/>
+                    <p:cNvSpPr txBox="1"/>
+                    <p:nvPr/>
+                  </p:nvSpPr>
+                  <p:spPr>
+                    <a:xfrm>
+                      <a:off x="5117467" y="3388940"/>
+                      <a:ext cx="301748" cy="274650"/>
+                    </a:xfrm>
+                    <a:prstGeom prst="rect">
+                      <a:avLst/>
+                    </a:prstGeom>
+                    <a:noFill/>
+                    <a:ln w="6350">
+                      <a:noFill/>
+                      <a:prstDash val="sysDash"/>
+                    </a:ln>
+                    <a:effectLst/>
+                  </p:spPr>
+                  <p:style>
+                    <a:lnRef idx="0">
+                      <a:schemeClr val="accent1"/>
+                    </a:lnRef>
+                    <a:fillRef idx="0">
+                      <a:schemeClr val="accent1"/>
+                    </a:fillRef>
+                    <a:effectRef idx="0">
+                      <a:schemeClr val="accent1"/>
+                    </a:effectRef>
+                    <a:fontRef idx="minor">
+                      <a:schemeClr val="dk1"/>
+                    </a:fontRef>
+                  </p:style>
+                  <p:txBody>
+                    <a:bodyPr rot="0" spcFirstLastPara="0" vert="horz" wrap="square" lIns="91440" tIns="45720" rIns="91440" bIns="45720" numCol="1" spcCol="0" rtlCol="0" fromWordArt="0" anchor="t" anchorCtr="0" forceAA="0" compatLnSpc="1">
+                      <a:prstTxWarp prst="textNoShape">
+                        <a:avLst/>
+                      </a:prstTxWarp>
+                      <a:noAutofit/>
+                    </a:bodyPr>
+                    <a:lstStyle/>
+                    <a:p>
+                      <a:pPr>
+                        <a:lnSpc>
+                          <a:spcPct val="107000"/>
+                        </a:lnSpc>
+                        <a:spcAft>
+                          <a:spcPts val="800"/>
+                        </a:spcAft>
+                      </a:pPr>
+                      <a14:m>
+                        <m:oMath xmlns:m="http://schemas.openxmlformats.org/officeDocument/2006/math">
+                          <m:r>
+                            <a:rPr lang="fr-FR" sz="1400" i="1" smtClean="0">
+                              <a:solidFill>
+                                <a:schemeClr val="tx1"/>
+                              </a:solidFill>
+                              <a:latin typeface="Cambria Math" panose="02040503050406030204" pitchFamily="18" charset="0"/>
+                              <a:ea typeface="Calibri" panose="020F0502020204030204" pitchFamily="34" charset="0"/>
+                              <a:cs typeface="Times New Roman" panose="02020603050405020304" pitchFamily="18" charset="0"/>
+                            </a:rPr>
+                            <m:t>𝜃</m:t>
+                          </m:r>
+                          <m:r>
+                            <a:rPr lang="fr-FR" sz="1400" i="1">
+                              <a:solidFill>
+                                <a:srgbClr val="036DBF"/>
+                              </a:solidFill>
+                              <a:latin typeface="Cambria Math" panose="02040503050406030204" pitchFamily="18" charset="0"/>
+                              <a:ea typeface="Calibri" panose="020F0502020204030204" pitchFamily="34" charset="0"/>
+                              <a:cs typeface="Times New Roman" panose="02020603050405020304" pitchFamily="18" charset="0"/>
+                            </a:rPr>
+                            <m:t> </m:t>
+                          </m:r>
+                        </m:oMath>
+                      </a14:m>
+                      <a:r>
+                        <a:rPr lang="fr-FR" sz="1400" dirty="0">
+                          <a:solidFill>
+                            <a:srgbClr val="036DBF"/>
+                          </a:solidFill>
+                          <a:effectLst/>
+                          <a:ea typeface="Calibri" panose="020F0502020204030204" pitchFamily="34" charset="0"/>
+                          <a:cs typeface="Times New Roman" panose="02020603050405020304" pitchFamily="18" charset="0"/>
+                        </a:rPr>
+                        <a:t> </a:t>
+                      </a:r>
+                    </a:p>
+                  </p:txBody>
+                </p:sp>
+              </mc:Choice>
+              <mc:Fallback>
+                <p:sp>
+                  <p:nvSpPr>
+                    <p:cNvPr id="53" name="Zone de texte 153"/>
+                    <p:cNvSpPr txBox="1">
+                      <a:spLocks noRot="1" noChangeAspect="1" noMove="1" noResize="1" noEditPoints="1" noAdjustHandles="1" noChangeArrowheads="1" noChangeShapeType="1" noTextEdit="1"/>
+                    </p:cNvSpPr>
+                    <p:nvPr/>
+                  </p:nvSpPr>
+                  <p:spPr>
+                    <a:xfrm>
+                      <a:off x="5117467" y="3388940"/>
+                      <a:ext cx="301748" cy="274650"/>
+                    </a:xfrm>
+                    <a:prstGeom prst="rect">
+                      <a:avLst/>
+                    </a:prstGeom>
+                    <a:blipFill rotWithShape="0">
+                      <a:blip r:embed="rId22"/>
+                      <a:stretch>
+                        <a:fillRect/>
+                      </a:stretch>
+                    </a:blipFill>
+                    <a:ln w="6350">
+                      <a:noFill/>
+                      <a:prstDash val="sysDash"/>
+                    </a:ln>
+                    <a:effectLst/>
+                  </p:spPr>
+                  <p:txBody>
+                    <a:bodyPr/>
+                    <a:lstStyle/>
+                    <a:p>
+                      <a:r>
+                        <a:rPr lang="fr-FR">
+                          <a:noFill/>
+                        </a:rPr>
+                        <a:t> </a:t>
+                      </a:r>
+                    </a:p>
+                  </p:txBody>
+                </p:sp>
+              </mc:Fallback>
+            </mc:AlternateContent>
+          </p:grpSp>
+          <mc:AlternateContent xmlns:mc="http://schemas.openxmlformats.org/markup-compatibility/2006">
+            <mc:Choice xmlns:a14="http://schemas.microsoft.com/office/drawing/2010/main" Requires="a14">
+              <p:sp>
+                <p:nvSpPr>
+                  <p:cNvPr id="58" name="Zone de texte 153"/>
+                  <p:cNvSpPr txBox="1"/>
+                  <p:nvPr/>
+                </p:nvSpPr>
+                <p:spPr>
+                  <a:xfrm>
+                    <a:off x="5814789" y="3080096"/>
+                    <a:ext cx="301748" cy="274650"/>
+                  </a:xfrm>
+                  <a:prstGeom prst="rect">
+                    <a:avLst/>
+                  </a:prstGeom>
+                  <a:noFill/>
+                  <a:ln w="6350">
+                    <a:noFill/>
+                    <a:prstDash val="sysDash"/>
+                  </a:ln>
+                  <a:effectLst/>
+                </p:spPr>
+                <p:style>
+                  <a:lnRef idx="0">
+                    <a:schemeClr val="accent1"/>
+                  </a:lnRef>
+                  <a:fillRef idx="0">
+                    <a:schemeClr val="accent1"/>
+                  </a:fillRef>
+                  <a:effectRef idx="0">
+                    <a:schemeClr val="accent1"/>
+                  </a:effectRef>
+                  <a:fontRef idx="minor">
+                    <a:schemeClr val="dk1"/>
+                  </a:fontRef>
+                </p:style>
+                <p:txBody>
+                  <a:bodyPr rot="0" spcFirstLastPara="0" vert="horz" wrap="square" lIns="91440" tIns="45720" rIns="91440" bIns="45720" numCol="1" spcCol="0" rtlCol="0" fromWordArt="0" anchor="t" anchorCtr="0" forceAA="0" compatLnSpc="1">
+                    <a:prstTxWarp prst="textNoShape">
+                      <a:avLst/>
+                    </a:prstTxWarp>
+                    <a:noAutofit/>
+                  </a:bodyPr>
+                  <a:lstStyle/>
+                  <a:p>
+                    <a:pPr>
+                      <a:lnSpc>
+                        <a:spcPct val="107000"/>
+                      </a:lnSpc>
+                      <a:spcAft>
+                        <a:spcPts val="800"/>
+                      </a:spcAft>
+                    </a:pPr>
+                    <a14:m>
+                      <m:oMath xmlns:m="http://schemas.openxmlformats.org/officeDocument/2006/math">
+                        <m:r>
+                          <a:rPr lang="fr-FR" sz="1400" i="1" smtClean="0">
+                            <a:solidFill>
+                              <a:schemeClr val="tx1"/>
+                            </a:solidFill>
+                            <a:latin typeface="Cambria Math" panose="02040503050406030204" pitchFamily="18" charset="0"/>
+                            <a:ea typeface="Calibri" panose="020F0502020204030204" pitchFamily="34" charset="0"/>
+                            <a:cs typeface="Times New Roman" panose="02020603050405020304" pitchFamily="18" charset="0"/>
+                          </a:rPr>
+                          <m:t>𝜓</m:t>
+                        </m:r>
+                        <m:r>
+                          <a:rPr lang="fr-FR" sz="1400" i="1">
+                            <a:solidFill>
+                              <a:srgbClr val="036DBF"/>
+                            </a:solidFill>
+                            <a:latin typeface="Cambria Math" panose="02040503050406030204" pitchFamily="18" charset="0"/>
+                            <a:ea typeface="Calibri" panose="020F0502020204030204" pitchFamily="34" charset="0"/>
+                            <a:cs typeface="Times New Roman" panose="02020603050405020304" pitchFamily="18" charset="0"/>
+                          </a:rPr>
+                          <m:t> </m:t>
+                        </m:r>
+                      </m:oMath>
+                    </a14:m>
+                    <a:r>
+                      <a:rPr lang="fr-FR" sz="1400" dirty="0">
+                        <a:solidFill>
+                          <a:srgbClr val="036DBF"/>
+                        </a:solidFill>
+                        <a:effectLst/>
+                        <a:ea typeface="Calibri" panose="020F0502020204030204" pitchFamily="34" charset="0"/>
+                        <a:cs typeface="Times New Roman" panose="02020603050405020304" pitchFamily="18" charset="0"/>
+                      </a:rPr>
+                      <a:t> </a:t>
+                    </a:r>
+                  </a:p>
+                </p:txBody>
+              </p:sp>
+            </mc:Choice>
+            <mc:Fallback>
+              <p:sp>
+                <p:nvSpPr>
+                  <p:cNvPr id="58" name="Zone de texte 153"/>
+                  <p:cNvSpPr txBox="1">
+                    <a:spLocks noRot="1" noChangeAspect="1" noMove="1" noResize="1" noEditPoints="1" noAdjustHandles="1" noChangeArrowheads="1" noChangeShapeType="1" noTextEdit="1"/>
+                  </p:cNvSpPr>
+                  <p:nvPr/>
+                </p:nvSpPr>
+                <p:spPr>
+                  <a:xfrm>
+                    <a:off x="5814789" y="3080096"/>
+                    <a:ext cx="301748" cy="274650"/>
+                  </a:xfrm>
+                  <a:prstGeom prst="rect">
+                    <a:avLst/>
+                  </a:prstGeom>
+                  <a:blipFill rotWithShape="0">
+                    <a:blip r:embed="rId23"/>
+                    <a:stretch>
+                      <a:fillRect b="-20000"/>
+                    </a:stretch>
+                  </a:blipFill>
+                  <a:ln w="6350">
+                    <a:noFill/>
+                    <a:prstDash val="sysDash"/>
+                  </a:ln>
+                  <a:effectLst/>
+                </p:spPr>
+                <p:txBody>
+                  <a:bodyPr/>
+                  <a:lstStyle/>
+                  <a:p>
+                    <a:r>
+                      <a:rPr lang="fr-FR">
+                        <a:noFill/>
+                      </a:rPr>
+                      <a:t> </a:t>
+                    </a:r>
+                  </a:p>
+                </p:txBody>
+              </p:sp>
+            </mc:Fallback>
+          </mc:AlternateContent>
+          <p:sp>
+            <p:nvSpPr>
+              <p:cNvPr id="56" name="Arc 55"/>
+              <p:cNvSpPr/>
+              <p:nvPr/>
+            </p:nvSpPr>
+            <p:spPr>
+              <a:xfrm rot="1719114">
+                <a:off x="5619426" y="2980865"/>
+                <a:ext cx="290512" cy="247074"/>
+              </a:xfrm>
+              <a:prstGeom prst="arc">
+                <a:avLst>
+                  <a:gd name="adj1" fmla="val 16200000"/>
+                  <a:gd name="adj2" fmla="val 2933405"/>
+                </a:avLst>
+              </a:prstGeom>
+              <a:ln w="12700">
+                <a:solidFill>
+                  <a:schemeClr val="tx1"/>
+                </a:solidFill>
+                <a:tailEnd type="triangle"/>
+              </a:ln>
+            </p:spPr>
+            <p:style>
+              <a:lnRef idx="1">
+                <a:schemeClr val="accent1"/>
+              </a:lnRef>
+              <a:fillRef idx="0">
+                <a:schemeClr val="accent1"/>
+              </a:fillRef>
+              <a:effectRef idx="0">
+                <a:schemeClr val="accent1"/>
+              </a:effectRef>
+              <a:fontRef idx="minor">
+                <a:schemeClr val="tx1"/>
+              </a:fontRef>
+            </p:style>
+            <p:txBody>
+              <a:bodyPr rtlCol="0" anchor="ctr"/>
+              <a:lstStyle/>
+              <a:p>
+                <a:pPr algn="ctr"/>
+                <a:endParaRPr lang="fr-FR"/>
+              </a:p>
+            </p:txBody>
+          </p:sp>
+        </p:grpSp>
+        <mc:AlternateContent xmlns:mc="http://schemas.openxmlformats.org/markup-compatibility/2006">
+          <mc:Choice xmlns:a14="http://schemas.microsoft.com/office/drawing/2010/main" Requires="a14">
+            <p:sp>
+              <p:nvSpPr>
+                <p:cNvPr id="64" name="Zone de texte 153"/>
+                <p:cNvSpPr txBox="1"/>
+                <p:nvPr/>
+              </p:nvSpPr>
+              <p:spPr>
+                <a:xfrm>
+                  <a:off x="5574443" y="3384824"/>
+                  <a:ext cx="301748" cy="274650"/>
+                </a:xfrm>
+                <a:prstGeom prst="rect">
+                  <a:avLst/>
+                </a:prstGeom>
+                <a:noFill/>
+                <a:ln w="6350">
+                  <a:noFill/>
+                  <a:prstDash val="sysDash"/>
+                </a:ln>
+                <a:effectLst/>
+              </p:spPr>
+              <p:style>
+                <a:lnRef idx="0">
+                  <a:schemeClr val="accent1"/>
+                </a:lnRef>
+                <a:fillRef idx="0">
+                  <a:schemeClr val="accent1"/>
+                </a:fillRef>
+                <a:effectRef idx="0">
+                  <a:schemeClr val="accent1"/>
+                </a:effectRef>
+                <a:fontRef idx="minor">
+                  <a:schemeClr val="dk1"/>
+                </a:fontRef>
+              </p:style>
+              <p:txBody>
+                <a:bodyPr rot="0" spcFirstLastPara="0" vert="horz" wrap="square" lIns="91440" tIns="45720" rIns="91440" bIns="45720" numCol="1" spcCol="0" rtlCol="0" fromWordArt="0" anchor="t" anchorCtr="0" forceAA="0" compatLnSpc="1">
+                  <a:prstTxWarp prst="textNoShape">
+                    <a:avLst/>
+                  </a:prstTxWarp>
+                  <a:noAutofit/>
+                </a:bodyPr>
+                <a:lstStyle/>
+                <a:p>
+                  <a:pPr>
+                    <a:lnSpc>
+                      <a:spcPct val="107000"/>
+                    </a:lnSpc>
+                    <a:spcAft>
+                      <a:spcPts val="800"/>
+                    </a:spcAft>
+                  </a:pPr>
+                  <a14:m>
+                    <m:oMath xmlns:m="http://schemas.openxmlformats.org/officeDocument/2006/math">
+                      <m:acc>
+                        <m:accPr>
+                          <m:chr m:val="̃"/>
+                          <m:ctrlPr>
+                            <a:rPr lang="fr-FR" sz="1400" b="0" i="1" smtClean="0">
+                              <a:solidFill>
+                                <a:srgbClr val="036DBF"/>
+                              </a:solidFill>
+                              <a:effectLst/>
+                              <a:latin typeface="Cambria Math" panose="02040503050406030204" pitchFamily="18" charset="0"/>
+                              <a:cs typeface="Times New Roman" panose="02020603050405020304" pitchFamily="18" charset="0"/>
+                            </a:rPr>
+                          </m:ctrlPr>
+                        </m:accPr>
+                        <m:e>
+                          <m:r>
+                            <a:rPr lang="fr-FR" sz="1400" b="0" i="1" smtClean="0">
+                              <a:solidFill>
+                                <a:srgbClr val="036DBF"/>
+                              </a:solidFill>
+                              <a:effectLst/>
+                              <a:latin typeface="Cambria Math" panose="02040503050406030204" pitchFamily="18" charset="0"/>
+                              <a:cs typeface="Times New Roman" panose="02020603050405020304" pitchFamily="18" charset="0"/>
+                            </a:rPr>
+                            <m:t>𝑢</m:t>
+                          </m:r>
+                        </m:e>
+                      </m:acc>
+                    </m:oMath>
+                  </a14:m>
+                  <a:r>
+                    <a:rPr lang="fr-FR" sz="1400" dirty="0">
+                      <a:solidFill>
+                        <a:srgbClr val="036DBF"/>
+                      </a:solidFill>
+                      <a:effectLst/>
+                      <a:ea typeface="Calibri" panose="020F0502020204030204" pitchFamily="34" charset="0"/>
+                      <a:cs typeface="Times New Roman" panose="02020603050405020304" pitchFamily="18" charset="0"/>
+                    </a:rPr>
+                    <a:t> </a:t>
+                  </a:r>
+                </a:p>
+              </p:txBody>
+            </p:sp>
+          </mc:Choice>
+          <mc:Fallback>
+            <p:sp>
+              <p:nvSpPr>
+                <p:cNvPr id="64" name="Zone de texte 153"/>
+                <p:cNvSpPr txBox="1">
+                  <a:spLocks noRot="1" noChangeAspect="1" noMove="1" noResize="1" noEditPoints="1" noAdjustHandles="1" noChangeArrowheads="1" noChangeShapeType="1" noTextEdit="1"/>
+                </p:cNvSpPr>
+                <p:nvPr/>
+              </p:nvSpPr>
+              <p:spPr>
+                <a:xfrm>
+                  <a:off x="5574443" y="3384824"/>
+                  <a:ext cx="301748" cy="274650"/>
+                </a:xfrm>
+                <a:prstGeom prst="rect">
+                  <a:avLst/>
+                </a:prstGeom>
+                <a:blipFill rotWithShape="0">
+                  <a:blip r:embed="rId24"/>
+                  <a:stretch>
+                    <a:fillRect/>
+                  </a:stretch>
+                </a:blipFill>
+                <a:ln w="6350">
+                  <a:noFill/>
+                  <a:prstDash val="sysDash"/>
+                </a:ln>
+                <a:effectLst/>
+              </p:spPr>
+              <p:txBody>
+                <a:bodyPr/>
+                <a:lstStyle/>
+                <a:p>
+                  <a:r>
+                    <a:rPr lang="fr-FR">
+                      <a:noFill/>
+                    </a:rPr>
+                    <a:t> </a:t>
+                  </a:r>
+                </a:p>
+              </p:txBody>
+            </p:sp>
+          </mc:Fallback>
+        </mc:AlternateContent>
+      </p:grpSp>
+    </p:spTree>
+    <p:extLst>
+      <p:ext uri="{BB962C8B-B14F-4D97-AF65-F5344CB8AC3E}">
+        <p14:creationId xmlns:p14="http://schemas.microsoft.com/office/powerpoint/2010/main" val="2335155220"/>
+      </p:ext>
+    </p:extLst>
+  </p:cSld>
+  <p:clrMapOvr>
+    <a:masterClrMapping/>
+  </p:clrMapOvr>
+  <p:timing>
+    <p:tnLst>
+      <p:par>
+        <p:cTn id="1" dur="indefinite" restart="never" nodeType="tmRoot"/>
+      </p:par>
+    </p:tnLst>
+  </p:timing>
+</p:sld>
+</file>
+
 <file path=ppt/theme/theme1.xml><?xml version="1.0" encoding="utf-8"?>
 <a:theme xmlns:a="http://schemas.openxmlformats.org/drawingml/2006/main" name="Thème Office">
   <a:themeElements>

</xml_diff>